<commit_message>
Upando pastas individuais com o protótipo de tela
</commit_message>
<xml_diff>
--- a/Documentação/HLD/HLD.pptx
+++ b/Documentação/HLD/HLD.pptx
@@ -112,6 +112,35 @@
 </p:presentation>
 </file>
 
+<file path=ppt/changesInfos/changesInfo1.xml><?xml version="1.0" encoding="utf-8"?>
+<pc:chgInfo xmlns:a="http://schemas.openxmlformats.org/drawingml/2006/main" xmlns:r="http://schemas.openxmlformats.org/officeDocument/2006/relationships" xmlns:ac="http://schemas.microsoft.com/office/drawing/2013/main/command" xmlns:pc="http://schemas.microsoft.com/office/powerpoint/2013/main/command">
+  <pc:docChgLst>
+    <pc:chgData name="Isabella Lima" userId="fe0713f97eca5c34" providerId="LiveId" clId="{AF47A50E-1C8E-40CF-9748-5FDE6CF35A1B}"/>
+    <pc:docChg chg="modSld">
+      <pc:chgData name="Isabella Lima" userId="fe0713f97eca5c34" providerId="LiveId" clId="{AF47A50E-1C8E-40CF-9748-5FDE6CF35A1B}" dt="2020-10-15T21:18:58.799" v="1" actId="1076"/>
+      <pc:docMkLst>
+        <pc:docMk/>
+      </pc:docMkLst>
+      <pc:sldChg chg="modSp mod">
+        <pc:chgData name="Isabella Lima" userId="fe0713f97eca5c34" providerId="LiveId" clId="{AF47A50E-1C8E-40CF-9748-5FDE6CF35A1B}" dt="2020-10-15T21:18:58.799" v="1" actId="1076"/>
+        <pc:sldMkLst>
+          <pc:docMk/>
+          <pc:sldMk cId="1043225642" sldId="257"/>
+        </pc:sldMkLst>
+        <pc:picChg chg="mod">
+          <ac:chgData name="Isabella Lima" userId="fe0713f97eca5c34" providerId="LiveId" clId="{AF47A50E-1C8E-40CF-9748-5FDE6CF35A1B}" dt="2020-10-15T21:18:58.799" v="1" actId="1076"/>
+          <ac:picMkLst>
+            <pc:docMk/>
+            <pc:sldMk cId="1043225642" sldId="257"/>
+            <ac:picMk id="115" creationId="{7DC173D6-9271-4FD9-9C49-4022B95AD4DE}"/>
+          </ac:picMkLst>
+        </pc:picChg>
+      </pc:sldChg>
+    </pc:docChg>
+  </pc:docChgLst>
+</pc:chgInfo>
+</file>
+
 <file path=ppt/slideLayouts/slideLayout1.xml><?xml version="1.0" encoding="utf-8"?>
 <p:sldLayout xmlns:a="http://schemas.openxmlformats.org/drawingml/2006/main" xmlns:r="http://schemas.openxmlformats.org/officeDocument/2006/relationships" xmlns:p="http://schemas.openxmlformats.org/presentationml/2006/main" type="title" preserve="1">
   <p:cSld name="Slide de Título">
@@ -259,7 +288,7 @@
           <a:p>
             <a:fld id="{8DD49C95-0325-45F8-96A6-5A0DD05A47A1}" type="datetimeFigureOut">
               <a:rPr lang="pt-BR" smtClean="0"/>
-              <a:t>28/09/2020</a:t>
+              <a:t>15/10/2020</a:t>
             </a:fld>
             <a:endParaRPr lang="pt-BR"/>
           </a:p>
@@ -457,7 +486,7 @@
           <a:p>
             <a:fld id="{8DD49C95-0325-45F8-96A6-5A0DD05A47A1}" type="datetimeFigureOut">
               <a:rPr lang="pt-BR" smtClean="0"/>
-              <a:t>28/09/2020</a:t>
+              <a:t>15/10/2020</a:t>
             </a:fld>
             <a:endParaRPr lang="pt-BR"/>
           </a:p>
@@ -665,7 +694,7 @@
           <a:p>
             <a:fld id="{8DD49C95-0325-45F8-96A6-5A0DD05A47A1}" type="datetimeFigureOut">
               <a:rPr lang="pt-BR" smtClean="0"/>
-              <a:t>28/09/2020</a:t>
+              <a:t>15/10/2020</a:t>
             </a:fld>
             <a:endParaRPr lang="pt-BR"/>
           </a:p>
@@ -863,7 +892,7 @@
           <a:p>
             <a:fld id="{8DD49C95-0325-45F8-96A6-5A0DD05A47A1}" type="datetimeFigureOut">
               <a:rPr lang="pt-BR" smtClean="0"/>
-              <a:t>28/09/2020</a:t>
+              <a:t>15/10/2020</a:t>
             </a:fld>
             <a:endParaRPr lang="pt-BR"/>
           </a:p>
@@ -1138,7 +1167,7 @@
           <a:p>
             <a:fld id="{8DD49C95-0325-45F8-96A6-5A0DD05A47A1}" type="datetimeFigureOut">
               <a:rPr lang="pt-BR" smtClean="0"/>
-              <a:t>28/09/2020</a:t>
+              <a:t>15/10/2020</a:t>
             </a:fld>
             <a:endParaRPr lang="pt-BR"/>
           </a:p>
@@ -1403,7 +1432,7 @@
           <a:p>
             <a:fld id="{8DD49C95-0325-45F8-96A6-5A0DD05A47A1}" type="datetimeFigureOut">
               <a:rPr lang="pt-BR" smtClean="0"/>
-              <a:t>28/09/2020</a:t>
+              <a:t>15/10/2020</a:t>
             </a:fld>
             <a:endParaRPr lang="pt-BR"/>
           </a:p>
@@ -1815,7 +1844,7 @@
           <a:p>
             <a:fld id="{8DD49C95-0325-45F8-96A6-5A0DD05A47A1}" type="datetimeFigureOut">
               <a:rPr lang="pt-BR" smtClean="0"/>
-              <a:t>28/09/2020</a:t>
+              <a:t>15/10/2020</a:t>
             </a:fld>
             <a:endParaRPr lang="pt-BR"/>
           </a:p>
@@ -1956,7 +1985,7 @@
           <a:p>
             <a:fld id="{8DD49C95-0325-45F8-96A6-5A0DD05A47A1}" type="datetimeFigureOut">
               <a:rPr lang="pt-BR" smtClean="0"/>
-              <a:t>28/09/2020</a:t>
+              <a:t>15/10/2020</a:t>
             </a:fld>
             <a:endParaRPr lang="pt-BR"/>
           </a:p>
@@ -2069,7 +2098,7 @@
           <a:p>
             <a:fld id="{8DD49C95-0325-45F8-96A6-5A0DD05A47A1}" type="datetimeFigureOut">
               <a:rPr lang="pt-BR" smtClean="0"/>
-              <a:t>28/09/2020</a:t>
+              <a:t>15/10/2020</a:t>
             </a:fld>
             <a:endParaRPr lang="pt-BR"/>
           </a:p>
@@ -2380,7 +2409,7 @@
           <a:p>
             <a:fld id="{8DD49C95-0325-45F8-96A6-5A0DD05A47A1}" type="datetimeFigureOut">
               <a:rPr lang="pt-BR" smtClean="0"/>
-              <a:t>28/09/2020</a:t>
+              <a:t>15/10/2020</a:t>
             </a:fld>
             <a:endParaRPr lang="pt-BR"/>
           </a:p>
@@ -2668,7 +2697,7 @@
           <a:p>
             <a:fld id="{8DD49C95-0325-45F8-96A6-5A0DD05A47A1}" type="datetimeFigureOut">
               <a:rPr lang="pt-BR" smtClean="0"/>
-              <a:t>28/09/2020</a:t>
+              <a:t>15/10/2020</a:t>
             </a:fld>
             <a:endParaRPr lang="pt-BR"/>
           </a:p>
@@ -2909,7 +2938,7 @@
           <a:p>
             <a:fld id="{8DD49C95-0325-45F8-96A6-5A0DD05A47A1}" type="datetimeFigureOut">
               <a:rPr lang="pt-BR" smtClean="0"/>
-              <a:t>28/09/2020</a:t>
+              <a:t>15/10/2020</a:t>
             </a:fld>
             <a:endParaRPr lang="pt-BR"/>
           </a:p>
@@ -5233,7 +5262,7 @@
         </p:blipFill>
         <p:spPr>
           <a:xfrm>
-            <a:off x="9306691" y="798460"/>
+            <a:off x="9353426" y="750165"/>
             <a:ext cx="2326352" cy="1608510"/>
           </a:xfrm>
           <a:prstGeom prst="rect">

</xml_diff>